<commit_message>
Rough fix ICP reverted
</commit_message>
<xml_diff>
--- a/teamC_day2.pptx
+++ b/teamC_day2.pptx
@@ -11698,8 +11698,8 @@
           </a:prstGeom>
         </p:spPr>
       </p:pic>
-      <mc:AlternateContent xmlns:mc="http://schemas.openxmlformats.org/markup-compatibility/2006">
-        <mc:Choice xmlns:p14="http://schemas.microsoft.com/office/powerpoint/2010/main" Requires="p14">
+      <mc:AlternateContent xmlns:mc="http://schemas.openxmlformats.org/markup-compatibility/2006" xmlns:p14="http://schemas.microsoft.com/office/powerpoint/2010/main">
+        <mc:Choice Requires="p14">
           <p:contentPart p14:bwMode="auto" r:id="rId3">
             <p14:nvContentPartPr>
               <p14:cNvPr id="6" name="Ink 5">
@@ -11718,7 +11718,7 @@
             </p14:xfrm>
           </p:contentPart>
         </mc:Choice>
-        <mc:Fallback>
+        <mc:Fallback xmlns="">
           <p:pic>
             <p:nvPicPr>
               <p:cNvPr id="6" name="Ink 5">
@@ -15989,6 +15989,66 @@
           </a:p>
         </p:txBody>
       </p:sp>
+      <p:pic>
+        <p:nvPicPr>
+          <p:cNvPr id="6" name="Picture 5">
+            <a:extLst>
+              <a:ext uri="{FF2B5EF4-FFF2-40B4-BE49-F238E27FC236}">
+                <a16:creationId xmlns:a16="http://schemas.microsoft.com/office/drawing/2014/main" id="{8983BC3B-5552-4716-8674-1D137831E15D}"/>
+              </a:ext>
+            </a:extLst>
+          </p:cNvPr>
+          <p:cNvPicPr>
+            <a:picLocks noChangeAspect="1"/>
+          </p:cNvPicPr>
+          <p:nvPr/>
+        </p:nvPicPr>
+        <p:blipFill>
+          <a:blip r:embed="rId2"/>
+          <a:stretch>
+            <a:fillRect/>
+          </a:stretch>
+        </p:blipFill>
+        <p:spPr>
+          <a:xfrm>
+            <a:off x="628650" y="2231609"/>
+            <a:ext cx="4140954" cy="3912615"/>
+          </a:xfrm>
+          <a:prstGeom prst="rect">
+            <a:avLst/>
+          </a:prstGeom>
+        </p:spPr>
+      </p:pic>
+      <p:pic>
+        <p:nvPicPr>
+          <p:cNvPr id="7" name="Picture 6">
+            <a:extLst>
+              <a:ext uri="{FF2B5EF4-FFF2-40B4-BE49-F238E27FC236}">
+                <a16:creationId xmlns:a16="http://schemas.microsoft.com/office/drawing/2014/main" id="{5652C745-0EBC-4D39-A090-93230DF77017}"/>
+              </a:ext>
+            </a:extLst>
+          </p:cNvPr>
+          <p:cNvPicPr>
+            <a:picLocks noChangeAspect="1"/>
+          </p:cNvPicPr>
+          <p:nvPr/>
+        </p:nvPicPr>
+        <p:blipFill>
+          <a:blip r:embed="rId3"/>
+          <a:stretch>
+            <a:fillRect/>
+          </a:stretch>
+        </p:blipFill>
+        <p:spPr>
+          <a:xfrm>
+            <a:off x="4682714" y="2231609"/>
+            <a:ext cx="4074785" cy="3916541"/>
+          </a:xfrm>
+          <a:prstGeom prst="rect">
+            <a:avLst/>
+          </a:prstGeom>
+        </p:spPr>
+      </p:pic>
     </p:spTree>
     <p:extLst>
       <p:ext uri="{BB962C8B-B14F-4D97-AF65-F5344CB8AC3E}">
@@ -19664,6 +19724,96 @@
           </a:p>
         </p:txBody>
       </p:sp>
+      <p:pic>
+        <p:nvPicPr>
+          <p:cNvPr id="6" name="Picture 5">
+            <a:extLst>
+              <a:ext uri="{FF2B5EF4-FFF2-40B4-BE49-F238E27FC236}">
+                <a16:creationId xmlns:a16="http://schemas.microsoft.com/office/drawing/2014/main" id="{4ADE3A5A-1D1B-4352-8E46-527528312CF4}"/>
+              </a:ext>
+            </a:extLst>
+          </p:cNvPr>
+          <p:cNvPicPr>
+            <a:picLocks noChangeAspect="1"/>
+          </p:cNvPicPr>
+          <p:nvPr/>
+        </p:nvPicPr>
+        <p:blipFill>
+          <a:blip r:embed="rId2"/>
+          <a:stretch>
+            <a:fillRect/>
+          </a:stretch>
+        </p:blipFill>
+        <p:spPr>
+          <a:xfrm>
+            <a:off x="905480" y="2507530"/>
+            <a:ext cx="4299041" cy="3669433"/>
+          </a:xfrm>
+          <a:prstGeom prst="rect">
+            <a:avLst/>
+          </a:prstGeom>
+        </p:spPr>
+      </p:pic>
+      <p:pic>
+        <p:nvPicPr>
+          <p:cNvPr id="7" name="Picture 6">
+            <a:extLst>
+              <a:ext uri="{FF2B5EF4-FFF2-40B4-BE49-F238E27FC236}">
+                <a16:creationId xmlns:a16="http://schemas.microsoft.com/office/drawing/2014/main" id="{A462B66D-9D8F-46D6-8D6D-E26F719AB5E6}"/>
+              </a:ext>
+            </a:extLst>
+          </p:cNvPr>
+          <p:cNvPicPr>
+            <a:picLocks noChangeAspect="1"/>
+          </p:cNvPicPr>
+          <p:nvPr/>
+        </p:nvPicPr>
+        <p:blipFill>
+          <a:blip r:embed="rId3"/>
+          <a:stretch>
+            <a:fillRect/>
+          </a:stretch>
+        </p:blipFill>
+        <p:spPr>
+          <a:xfrm>
+            <a:off x="4371479" y="2507529"/>
+            <a:ext cx="4199407" cy="3669434"/>
+          </a:xfrm>
+          <a:prstGeom prst="rect">
+            <a:avLst/>
+          </a:prstGeom>
+        </p:spPr>
+      </p:pic>
+      <p:pic>
+        <p:nvPicPr>
+          <p:cNvPr id="8" name="Picture 7">
+            <a:extLst>
+              <a:ext uri="{FF2B5EF4-FFF2-40B4-BE49-F238E27FC236}">
+                <a16:creationId xmlns:a16="http://schemas.microsoft.com/office/drawing/2014/main" id="{07BFE8EF-6B78-431A-9801-AFFDD7A82BCC}"/>
+              </a:ext>
+            </a:extLst>
+          </p:cNvPr>
+          <p:cNvPicPr>
+            <a:picLocks noChangeAspect="1"/>
+          </p:cNvPicPr>
+          <p:nvPr/>
+        </p:nvPicPr>
+        <p:blipFill>
+          <a:blip r:embed="rId2"/>
+          <a:stretch>
+            <a:fillRect/>
+          </a:stretch>
+        </p:blipFill>
+        <p:spPr>
+          <a:xfrm>
+            <a:off x="516727" y="2507528"/>
+            <a:ext cx="4299041" cy="3669433"/>
+          </a:xfrm>
+          <a:prstGeom prst="rect">
+            <a:avLst/>
+          </a:prstGeom>
+        </p:spPr>
+      </p:pic>
     </p:spTree>
     <p:extLst>
       <p:ext uri="{BB962C8B-B14F-4D97-AF65-F5344CB8AC3E}">

</xml_diff>